<commit_message>
Updated Limit Switch explanation
</commit_message>
<xml_diff>
--- a/Chapter 3 - ControlTheory/Sensors - Start Here.pptx
+++ b/Chapter 3 - ControlTheory/Sensors - Start Here.pptx
@@ -264,7 +264,7 @@
       <p15:sldGuideLst xmlns:p15="http://schemas.microsoft.com/office/powerpoint/2012/main"/>
     </p:ext>
     <p:ext uri="http://customooxmlschemas.google.com/">
-      <go:slidesCustomData xmlns="" xmlns:mc="http://schemas.openxmlformats.org/markup-compatibility/2006" xmlns:mv="urn:schemas-microsoft-com:mac:vml" xmlns:c="http://schemas.openxmlformats.org/drawingml/2006/chart" xmlns:dgm="http://schemas.openxmlformats.org/drawingml/2006/diagram" xmlns:o="urn:schemas-microsoft-com:office:office" xmlns:v="urn:schemas-microsoft-com:vml" xmlns:pvml="urn:schemas-microsoft-com:office:powerpoint" xmlns:com="http://schemas.openxmlformats.org/drawingml/2006/compatibility" xmlns:p14="http://schemas.microsoft.com/office/powerpoint/2010/main" xmlns:p15="http://schemas.microsoft.com/office/powerpoint/2012/main" xmlns:ahyp="http://schemas.microsoft.com/office/drawing/2018/hyperlinkcolor" xmlns:go="http://customooxmlschemas.google.com/" r:id="rId38" roundtripDataSignature="AMtx7mhUVJU3jbxGl11X7yrLJ5REy1msmg=="/>
+      <go:slidesCustomData xmlns:go="http://customooxmlschemas.google.com/" xmlns:ahyp="http://schemas.microsoft.com/office/drawing/2018/hyperlinkcolor" xmlns:p15="http://schemas.microsoft.com/office/powerpoint/2012/main" xmlns:p14="http://schemas.microsoft.com/office/powerpoint/2010/main" xmlns:com="http://schemas.openxmlformats.org/drawingml/2006/compatibility" xmlns:pvml="urn:schemas-microsoft-com:office:powerpoint" xmlns:v="urn:schemas-microsoft-com:vml" xmlns:o="urn:schemas-microsoft-com:office:office" xmlns:dgm="http://schemas.openxmlformats.org/drawingml/2006/diagram" xmlns:c="http://schemas.openxmlformats.org/drawingml/2006/chart" xmlns:mv="urn:schemas-microsoft-com:mac:vml" xmlns:mc="http://schemas.openxmlformats.org/markup-compatibility/2006" xmlns="" r:id="rId38" roundtripDataSignature="AMtx7mhUVJU3jbxGl11X7yrLJ5REy1msmg=="/>
     </p:ext>
   </p:extLst>
 </p:presentation>
@@ -19930,6 +19930,61 @@
           </a:p>
         </p:txBody>
       </p:sp>
+      <p:sp>
+        <p:nvSpPr>
+          <p:cNvPr id="3" name="TextBox 2">
+            <a:extLst>
+              <a:ext uri="{FF2B5EF4-FFF2-40B4-BE49-F238E27FC236}">
+                <a16:creationId xmlns:a16="http://schemas.microsoft.com/office/drawing/2014/main" id="{13884DD5-7CF9-32CA-8B79-F65D60A2A312}"/>
+              </a:ext>
+            </a:extLst>
+          </p:cNvPr>
+          <p:cNvSpPr txBox="1"/>
+          <p:nvPr/>
+        </p:nvSpPr>
+        <p:spPr>
+          <a:xfrm>
+            <a:off x="72956" y="4701786"/>
+            <a:ext cx="6903481" cy="276999"/>
+          </a:xfrm>
+          <a:prstGeom prst="rect">
+            <a:avLst/>
+          </a:prstGeom>
+          <a:noFill/>
+        </p:spPr>
+        <p:txBody>
+          <a:bodyPr wrap="square" rtlCol="0">
+            <a:spAutoFit/>
+          </a:bodyPr>
+          <a:lstStyle/>
+          <a:p>
+            <a:r>
+              <a:rPr lang="en-US" sz="1200" dirty="0">
+                <a:solidFill>
+                  <a:srgbClr val="FF0000"/>
+                </a:solidFill>
+              </a:rPr>
+              <a:t>*We will use a custom object “</a:t>
+            </a:r>
+            <a:r>
+              <a:rPr lang="en-US" sz="1200" dirty="0" err="1">
+                <a:solidFill>
+                  <a:srgbClr val="FF0000"/>
+                </a:solidFill>
+              </a:rPr>
+              <a:t>LimitSwitch</a:t>
+            </a:r>
+            <a:r>
+              <a:rPr lang="en-US" sz="1200" dirty="0">
+                <a:solidFill>
+                  <a:srgbClr val="FF0000"/>
+                </a:solidFill>
+              </a:rPr>
+              <a:t>” from “LimitSwitch.java” (source code here)</a:t>
+            </a:r>
+          </a:p>
+        </p:txBody>
+      </p:sp>
     </p:spTree>
     <p:extLst>
       <p:ext uri="{BB962C8B-B14F-4D97-AF65-F5344CB8AC3E}">

</xml_diff>